<commit_message>
En we zijn er bijna ;-)
</commit_message>
<xml_diff>
--- a/Thesis - 2/Poster/Poster.pptx
+++ b/Thesis - 2/Poster/Poster.pptx
@@ -3446,7 +3446,7 @@
             </a:lvl9pPr>
           </a:lstStyle>
           <a:p>
-            <a:pPr eaLnBrk="1" hangingPunct="1">
+            <a:pPr marL="536575" indent="-536575" eaLnBrk="1" hangingPunct="1">
               <a:spcBef>
                 <a:spcPct val="20000"/>
               </a:spcBef>
@@ -3461,7 +3461,7 @@
             </a:r>
           </a:p>
           <a:p>
-            <a:pPr eaLnBrk="1" hangingPunct="1">
+            <a:pPr marL="536575" indent="-536575" eaLnBrk="1" hangingPunct="1">
               <a:spcBef>
                 <a:spcPct val="20000"/>
               </a:spcBef>
@@ -3491,7 +3491,7 @@
             </a:endParaRPr>
           </a:p>
           <a:p>
-            <a:pPr eaLnBrk="1" hangingPunct="1">
+            <a:pPr marL="536575" indent="-536575" eaLnBrk="1" hangingPunct="1">
               <a:spcBef>
                 <a:spcPct val="20000"/>
               </a:spcBef>
@@ -3521,7 +3521,7 @@
             </a:endParaRPr>
           </a:p>
           <a:p>
-            <a:pPr eaLnBrk="1" hangingPunct="1">
+            <a:pPr marL="536575" indent="-536575" eaLnBrk="1" hangingPunct="1">
               <a:spcBef>
                 <a:spcPct val="20000"/>
               </a:spcBef>
@@ -3545,85 +3545,85 @@
             </a:endParaRPr>
           </a:p>
           <a:p>
-            <a:pPr eaLnBrk="1" hangingPunct="1">
+            <a:pPr marL="536575" indent="-536575" eaLnBrk="1" hangingPunct="1">
               <a:spcBef>
                 <a:spcPct val="20000"/>
               </a:spcBef>
               <a:buFontTx/>
               <a:buChar char="•"/>
             </a:pPr>
+            <a:endParaRPr lang="nl-BE" altLang="nl-BE" sz="4000" dirty="0" smtClean="0">
+              <a:latin typeface="Calibri" panose="020F0502020204030204" pitchFamily="34" charset="0"/>
+            </a:endParaRPr>
+          </a:p>
+          <a:p>
+            <a:pPr marL="536575" indent="-536575" eaLnBrk="1" hangingPunct="1">
+              <a:spcBef>
+                <a:spcPct val="20000"/>
+              </a:spcBef>
+              <a:buFontTx/>
+              <a:buChar char="•"/>
+            </a:pPr>
+            <a:r>
+              <a:rPr lang="en-GB" altLang="nl-BE" sz="4000" dirty="0" err="1" smtClean="0">
+                <a:latin typeface="Calibri" panose="020F0502020204030204" pitchFamily="34" charset="0"/>
+              </a:rPr>
+              <a:t>Strikte</a:t>
+            </a:r>
+            <a:r>
+              <a:rPr lang="en-GB" altLang="nl-BE" sz="4000" dirty="0" smtClean="0">
+                <a:latin typeface="Calibri" panose="020F0502020204030204" pitchFamily="34" charset="0"/>
+              </a:rPr>
+              <a:t> </a:t>
+            </a:r>
+            <a:r>
+              <a:rPr lang="en-GB" altLang="nl-BE" sz="4000" dirty="0" err="1">
+                <a:latin typeface="Calibri" panose="020F0502020204030204" pitchFamily="34" charset="0"/>
+              </a:rPr>
+              <a:t>consistentie</a:t>
+            </a:r>
+            <a:r>
+              <a:rPr lang="en-GB" altLang="nl-BE" sz="4000" dirty="0">
+                <a:latin typeface="Calibri" panose="020F0502020204030204" pitchFamily="34" charset="0"/>
+              </a:rPr>
+              <a:t> </a:t>
+            </a:r>
+            <a:r>
+              <a:rPr lang="en-GB" altLang="nl-BE" sz="4000" dirty="0" err="1">
+                <a:latin typeface="Calibri" panose="020F0502020204030204" pitchFamily="34" charset="0"/>
+              </a:rPr>
+              <a:t>bij</a:t>
+            </a:r>
+            <a:r>
+              <a:rPr lang="en-GB" altLang="nl-BE" sz="4000" dirty="0">
+                <a:latin typeface="Calibri" panose="020F0502020204030204" pitchFamily="34" charset="0"/>
+              </a:rPr>
+              <a:t> </a:t>
+            </a:r>
+            <a:r>
+              <a:rPr lang="en-GB" altLang="nl-BE" sz="4000" dirty="0" err="1">
+                <a:latin typeface="Calibri" panose="020F0502020204030204" pitchFamily="34" charset="0"/>
+              </a:rPr>
+              <a:t>standaard</a:t>
+            </a:r>
+            <a:r>
+              <a:rPr lang="en-GB" altLang="nl-BE" sz="4000" dirty="0">
+                <a:latin typeface="Calibri" panose="020F0502020204030204" pitchFamily="34" charset="0"/>
+              </a:rPr>
+              <a:t> lees- en </a:t>
+            </a:r>
+            <a:r>
+              <a:rPr lang="en-GB" altLang="nl-BE" sz="4000" dirty="0" err="1">
+                <a:latin typeface="Calibri" panose="020F0502020204030204" pitchFamily="34" charset="0"/>
+              </a:rPr>
+              <a:t>schrijfbewerking</a:t>
+            </a:r>
             <a:endParaRPr lang="nl-BE" altLang="nl-BE" sz="4000" dirty="0">
               <a:latin typeface="Calibri" panose="020F0502020204030204" pitchFamily="34" charset="0"/>
             </a:endParaRPr>
           </a:p>
           <a:p>
-            <a:pPr eaLnBrk="1" hangingPunct="1">
-              <a:spcBef>
-                <a:spcPct val="20000"/>
-              </a:spcBef>
-              <a:buFontTx/>
-              <a:buChar char="•"/>
-            </a:pPr>
-            <a:r>
-              <a:rPr lang="en-GB" altLang="nl-BE" sz="4000" dirty="0" err="1">
-                <a:latin typeface="Calibri" panose="020F0502020204030204" pitchFamily="34" charset="0"/>
-              </a:rPr>
-              <a:t>Strikte</a:t>
-            </a:r>
-            <a:r>
-              <a:rPr lang="en-GB" altLang="nl-BE" sz="4000" dirty="0">
-                <a:latin typeface="Calibri" panose="020F0502020204030204" pitchFamily="34" charset="0"/>
-              </a:rPr>
-              <a:t> </a:t>
-            </a:r>
-            <a:r>
-              <a:rPr lang="en-GB" altLang="nl-BE" sz="4000" dirty="0" err="1">
-                <a:latin typeface="Calibri" panose="020F0502020204030204" pitchFamily="34" charset="0"/>
-              </a:rPr>
-              <a:t>consistentie</a:t>
-            </a:r>
-            <a:r>
-              <a:rPr lang="en-GB" altLang="nl-BE" sz="4000" dirty="0">
-                <a:latin typeface="Calibri" panose="020F0502020204030204" pitchFamily="34" charset="0"/>
-              </a:rPr>
-              <a:t> </a:t>
-            </a:r>
-            <a:r>
-              <a:rPr lang="en-GB" altLang="nl-BE" sz="4000" dirty="0" err="1">
-                <a:latin typeface="Calibri" panose="020F0502020204030204" pitchFamily="34" charset="0"/>
-              </a:rPr>
-              <a:t>bij</a:t>
-            </a:r>
-            <a:r>
-              <a:rPr lang="en-GB" altLang="nl-BE" sz="4000" dirty="0">
-                <a:latin typeface="Calibri" panose="020F0502020204030204" pitchFamily="34" charset="0"/>
-              </a:rPr>
-              <a:t> </a:t>
-            </a:r>
-            <a:r>
-              <a:rPr lang="en-GB" altLang="nl-BE" sz="4000" dirty="0" err="1">
-                <a:latin typeface="Calibri" panose="020F0502020204030204" pitchFamily="34" charset="0"/>
-              </a:rPr>
-              <a:t>standaard</a:t>
-            </a:r>
-            <a:r>
-              <a:rPr lang="en-GB" altLang="nl-BE" sz="4000" dirty="0">
-                <a:latin typeface="Calibri" panose="020F0502020204030204" pitchFamily="34" charset="0"/>
-              </a:rPr>
-              <a:t> lees- en </a:t>
-            </a:r>
-            <a:r>
-              <a:rPr lang="en-GB" altLang="nl-BE" sz="4000" dirty="0" err="1">
-                <a:latin typeface="Calibri" panose="020F0502020204030204" pitchFamily="34" charset="0"/>
-              </a:rPr>
-              <a:t>schrijfbewerking</a:t>
-            </a:r>
-            <a:endParaRPr lang="nl-BE" altLang="nl-BE" sz="4000" dirty="0">
-              <a:latin typeface="Calibri" panose="020F0502020204030204" pitchFamily="34" charset="0"/>
-            </a:endParaRPr>
-          </a:p>
-          <a:p>
-            <a:pPr eaLnBrk="1" hangingPunct="1">
+            <a:pPr marL="536575" indent="-536575" eaLnBrk="1" hangingPunct="1">
               <a:spcBef>
                 <a:spcPct val="20000"/>
               </a:spcBef>
@@ -6503,10 +6503,16 @@
               <a:defRPr/>
             </a:pPr>
             <a:r>
+              <a:rPr lang="en-US" altLang="nl-BE" sz="4000" dirty="0" smtClean="0">
+                <a:latin typeface="Calibri" panose="020F0502020204030204" pitchFamily="34" charset="0"/>
+              </a:rPr>
+              <a:t>Op 300s</a:t>
+            </a:r>
+            <a:r>
               <a:rPr lang="en-US" altLang="nl-BE" sz="4000" dirty="0">
                 <a:latin typeface="Calibri" panose="020F0502020204030204" pitchFamily="34" charset="0"/>
               </a:rPr>
-              <a:t>300s: Stop server</a:t>
+              <a:t>: Stop server</a:t>
             </a:r>
           </a:p>
           <a:p>
@@ -6519,10 +6525,16 @@
               <a:defRPr/>
             </a:pPr>
             <a:r>
+              <a:rPr lang="en-US" altLang="nl-BE" sz="4000" dirty="0" smtClean="0">
+                <a:latin typeface="Calibri" panose="020F0502020204030204" pitchFamily="34" charset="0"/>
+              </a:rPr>
+              <a:t>Op 600s</a:t>
+            </a:r>
+            <a:r>
               <a:rPr lang="en-US" altLang="nl-BE" sz="4000" dirty="0">
                 <a:latin typeface="Calibri" panose="020F0502020204030204" pitchFamily="34" charset="0"/>
               </a:rPr>
-              <a:t>600s: </a:t>
+              <a:t>: </a:t>
             </a:r>
             <a:r>
               <a:rPr lang="en-US" altLang="nl-BE" sz="4000" dirty="0" err="1">
@@ -6587,7 +6599,7 @@
               <a:defRPr/>
             </a:pPr>
             <a:r>
-              <a:rPr lang="en-US" altLang="nl-BE" sz="4000" b="1" dirty="0" err="1">
+              <a:rPr lang="en-US" altLang="nl-BE" sz="4000" b="1" dirty="0" err="1" smtClean="0">
                 <a:solidFill>
                   <a:srgbClr val="000000"/>
                 </a:solidFill>
@@ -6595,15 +6607,12 @@
               </a:rPr>
               <a:t>Consistentie</a:t>
             </a:r>
-            <a:endParaRPr lang="en-US" altLang="nl-BE" sz="4000" b="1" dirty="0">
-              <a:solidFill>
-                <a:srgbClr val="000000"/>
-              </a:solidFill>
+            <a:endParaRPr lang="en-US" altLang="nl-BE" sz="4000" dirty="0">
               <a:latin typeface="Calibri" panose="020F0502020204030204" pitchFamily="34" charset="0"/>
             </a:endParaRPr>
           </a:p>
           <a:p>
-            <a:pPr marL="266700" indent="-266700" eaLnBrk="1" hangingPunct="1">
+            <a:pPr marL="536575" indent="-536575" eaLnBrk="1" hangingPunct="1">
               <a:spcBef>
                 <a:spcPct val="20000"/>
               </a:spcBef>
@@ -6612,32 +6621,23 @@
               <a:defRPr/>
             </a:pPr>
             <a:r>
-              <a:rPr lang="en-US" altLang="nl-BE" sz="4000" dirty="0">
-                <a:solidFill>
-                  <a:srgbClr val="000000"/>
-                </a:solidFill>
+              <a:rPr lang="en-US" altLang="nl-BE" sz="4000" smtClean="0">
                 <a:latin typeface="Calibri" panose="020F0502020204030204" pitchFamily="34" charset="0"/>
               </a:rPr>
               <a:t>1 </a:t>
             </a:r>
             <a:r>
               <a:rPr lang="en-US" altLang="nl-BE" sz="4000" dirty="0" err="1">
-                <a:solidFill>
-                  <a:srgbClr val="000000"/>
-                </a:solidFill>
                 <a:latin typeface="Calibri" panose="020F0502020204030204" pitchFamily="34" charset="0"/>
               </a:rPr>
               <a:t>schrijver</a:t>
             </a:r>
             <a:endParaRPr lang="en-US" altLang="nl-BE" sz="4000" dirty="0">
-              <a:solidFill>
-                <a:srgbClr val="000000"/>
-              </a:solidFill>
               <a:latin typeface="Calibri" panose="020F0502020204030204" pitchFamily="34" charset="0"/>
             </a:endParaRPr>
           </a:p>
           <a:p>
-            <a:pPr marL="266700" indent="-266700" eaLnBrk="1" hangingPunct="1">
+            <a:pPr marL="536575" indent="-536575" eaLnBrk="1" hangingPunct="1">
               <a:spcBef>
                 <a:spcPct val="20000"/>
               </a:spcBef>
@@ -6647,40 +6647,28 @@
             </a:pPr>
             <a:r>
               <a:rPr lang="en-US" altLang="nl-BE" sz="4000" dirty="0" err="1">
-                <a:solidFill>
-                  <a:srgbClr val="000000"/>
-                </a:solidFill>
                 <a:latin typeface="Calibri" panose="020F0502020204030204" pitchFamily="34" charset="0"/>
               </a:rPr>
               <a:t>Verschillende</a:t>
             </a:r>
             <a:r>
               <a:rPr lang="en-US" altLang="nl-BE" sz="4000" dirty="0">
-                <a:solidFill>
-                  <a:srgbClr val="000000"/>
-                </a:solidFill>
                 <a:latin typeface="Calibri" panose="020F0502020204030204" pitchFamily="34" charset="0"/>
               </a:rPr>
               <a:t> </a:t>
             </a:r>
             <a:r>
               <a:rPr lang="en-US" altLang="nl-BE" sz="4000" dirty="0" err="1">
-                <a:solidFill>
-                  <a:srgbClr val="000000"/>
-                </a:solidFill>
                 <a:latin typeface="Calibri" panose="020F0502020204030204" pitchFamily="34" charset="0"/>
               </a:rPr>
               <a:t>lezers</a:t>
             </a:r>
             <a:endParaRPr lang="en-US" altLang="nl-BE" sz="4000" dirty="0">
-              <a:solidFill>
-                <a:srgbClr val="000000"/>
-              </a:solidFill>
               <a:latin typeface="Calibri" panose="020F0502020204030204" pitchFamily="34" charset="0"/>
             </a:endParaRPr>
           </a:p>
           <a:p>
-            <a:pPr marL="266700" indent="-266700" eaLnBrk="1" hangingPunct="1">
+            <a:pPr marL="536575" indent="-536575" eaLnBrk="1" hangingPunct="1">
               <a:spcBef>
                 <a:spcPct val="20000"/>
               </a:spcBef>
@@ -6690,66 +6678,45 @@
             </a:pPr>
             <a:r>
               <a:rPr lang="en-US" altLang="nl-BE" sz="4000" dirty="0">
-                <a:solidFill>
-                  <a:srgbClr val="000000"/>
-                </a:solidFill>
                 <a:latin typeface="Calibri" panose="020F0502020204030204" pitchFamily="34" charset="0"/>
               </a:rPr>
               <a:t>Lees tot de data </a:t>
             </a:r>
             <a:br>
               <a:rPr lang="en-US" altLang="nl-BE" sz="4000" dirty="0">
-                <a:solidFill>
-                  <a:srgbClr val="000000"/>
-                </a:solidFill>
                 <a:latin typeface="Calibri" panose="020F0502020204030204" pitchFamily="34" charset="0"/>
               </a:rPr>
             </a:br>
             <a:r>
               <a:rPr lang="en-US" altLang="nl-BE" sz="4000" dirty="0">
-                <a:solidFill>
-                  <a:srgbClr val="000000"/>
-                </a:solidFill>
                 <a:latin typeface="Calibri" panose="020F0502020204030204" pitchFamily="34" charset="0"/>
               </a:rPr>
               <a:t>correct </a:t>
             </a:r>
             <a:r>
               <a:rPr lang="en-US" altLang="nl-BE" sz="4000" dirty="0" err="1">
-                <a:solidFill>
-                  <a:srgbClr val="000000"/>
-                </a:solidFill>
                 <a:latin typeface="Calibri" panose="020F0502020204030204" pitchFamily="34" charset="0"/>
               </a:rPr>
               <a:t>wordt</a:t>
             </a:r>
             <a:r>
               <a:rPr lang="en-US" altLang="nl-BE" sz="4000" dirty="0">
-                <a:solidFill>
-                  <a:srgbClr val="000000"/>
-                </a:solidFill>
                 <a:latin typeface="Calibri" panose="020F0502020204030204" pitchFamily="34" charset="0"/>
               </a:rPr>
               <a:t> </a:t>
             </a:r>
             <a:br>
               <a:rPr lang="en-US" altLang="nl-BE" sz="4000" dirty="0">
-                <a:solidFill>
-                  <a:srgbClr val="000000"/>
-                </a:solidFill>
                 <a:latin typeface="Calibri" panose="020F0502020204030204" pitchFamily="34" charset="0"/>
               </a:rPr>
             </a:br>
             <a:r>
               <a:rPr lang="en-US" altLang="nl-BE" sz="4000" dirty="0" err="1">
-                <a:solidFill>
-                  <a:srgbClr val="000000"/>
-                </a:solidFill>
                 <a:latin typeface="Calibri" panose="020F0502020204030204" pitchFamily="34" charset="0"/>
               </a:rPr>
               <a:t>gelezen</a:t>
             </a:r>
-            <a:endParaRPr lang="en-US" altLang="nl-BE" sz="2000" b="1" dirty="0">
+            <a:endParaRPr lang="en-US" altLang="nl-BE" sz="4000" dirty="0">
               <a:latin typeface="Calibri" panose="020F0502020204030204" pitchFamily="34" charset="0"/>
             </a:endParaRPr>
           </a:p>
@@ -7872,8 +7839,8 @@
           </a:p>
         </p:txBody>
       </p:sp>
-      <mc:AlternateContent xmlns:mc="http://schemas.openxmlformats.org/markup-compatibility/2006">
-        <mc:Choice xmlns:a14="http://schemas.microsoft.com/office/drawing/2010/main" Requires="a14">
+      <mc:AlternateContent xmlns:mc="http://schemas.openxmlformats.org/markup-compatibility/2006" xmlns:a14="http://schemas.microsoft.com/office/drawing/2010/main">
+        <mc:Choice Requires="a14">
           <p:sp>
             <p:nvSpPr>
               <p:cNvPr id="38" name="Rectangle 37"/>
@@ -8406,7 +8373,7 @@
             </p:txBody>
           </p:sp>
         </mc:Choice>
-        <mc:Fallback>
+        <mc:Fallback xmlns="">
           <p:sp>
             <p:nvSpPr>
               <p:cNvPr id="38" name="Rectangle 37"/>

</xml_diff>